<commit_message>
added Logo W/o background
</commit_message>
<xml_diff>
--- a/documents/MealMate.pptx
+++ b/documents/MealMate.pptx
@@ -2,7 +2,7 @@
 <file path=ppt/presentation.xml><?xml version="1.0" encoding="utf-8"?>
 <p:presentation xmlns:a="http://schemas.openxmlformats.org/drawingml/2006/main" xmlns:r="http://schemas.openxmlformats.org/officeDocument/2006/relationships" xmlns:p="http://schemas.openxmlformats.org/presentationml/2006/main" saveSubsetFonts="1">
   <p:sldMasterIdLst>
-    <p:sldMasterId id="2147483660" r:id="rId1"/>
+    <p:sldMasterId id="2147483672" r:id="rId1"/>
   </p:sldMasterIdLst>
   <p:notesMasterIdLst>
     <p:notesMasterId r:id="rId4"/>
@@ -108,6 +108,11 @@
       </a:defRPr>
     </a:lvl9pPr>
   </p:defaultTextStyle>
+  <p:extLst>
+    <p:ext uri="{EFAFB233-063F-42B5-8137-9DF3F51BA10A}">
+      <p15:sldGuideLst xmlns:p15="http://schemas.microsoft.com/office/powerpoint/2012/main"/>
+    </p:ext>
+  </p:extLst>
 </p:presentation>
 </file>
 
@@ -193,7 +198,7 @@
           <a:p>
             <a:fld id="{FFA9FFD4-4F0D-4F2D-9071-A26729C5BABF}" type="datetimeFigureOut">
               <a:rPr lang="en-US" smtClean="0"/>
-              <a:t>1/17/2023</a:t>
+              <a:t>1/22/2023</a:t>
             </a:fld>
             <a:endParaRPr lang="en-US"/>
           </a:p>
@@ -722,7 +727,7 @@
           <a:p>
             <a:fld id="{11A60EF7-69E8-4C76-95C9-086CD8F4F7C7}" type="datetimeFigureOut">
               <a:rPr lang="en-US" smtClean="0"/>
-              <a:t>1/17/2023</a:t>
+              <a:t>1/22/2023</a:t>
             </a:fld>
             <a:endParaRPr lang="en-US"/>
           </a:p>
@@ -773,7 +778,7 @@
     </p:spTree>
     <p:extLst>
       <p:ext uri="{BB962C8B-B14F-4D97-AF65-F5344CB8AC3E}">
-        <p14:creationId xmlns:p14="http://schemas.microsoft.com/office/powerpoint/2010/main" val="2677183507"/>
+        <p14:creationId xmlns:p14="http://schemas.microsoft.com/office/powerpoint/2010/main" val="581317881"/>
       </p:ext>
     </p:extLst>
   </p:cSld>
@@ -892,7 +897,7 @@
           <a:p>
             <a:fld id="{11A60EF7-69E8-4C76-95C9-086CD8F4F7C7}" type="datetimeFigureOut">
               <a:rPr lang="en-US" smtClean="0"/>
-              <a:t>1/17/2023</a:t>
+              <a:t>1/22/2023</a:t>
             </a:fld>
             <a:endParaRPr lang="en-US"/>
           </a:p>
@@ -943,7 +948,7 @@
     </p:spTree>
     <p:extLst>
       <p:ext uri="{BB962C8B-B14F-4D97-AF65-F5344CB8AC3E}">
-        <p14:creationId xmlns:p14="http://schemas.microsoft.com/office/powerpoint/2010/main" val="3205727119"/>
+        <p14:creationId xmlns:p14="http://schemas.microsoft.com/office/powerpoint/2010/main" val="3099002883"/>
       </p:ext>
     </p:extLst>
   </p:cSld>
@@ -1072,7 +1077,7 @@
           <a:p>
             <a:fld id="{11A60EF7-69E8-4C76-95C9-086CD8F4F7C7}" type="datetimeFigureOut">
               <a:rPr lang="en-US" smtClean="0"/>
-              <a:t>1/17/2023</a:t>
+              <a:t>1/22/2023</a:t>
             </a:fld>
             <a:endParaRPr lang="en-US"/>
           </a:p>
@@ -1123,7 +1128,7 @@
     </p:spTree>
     <p:extLst>
       <p:ext uri="{BB962C8B-B14F-4D97-AF65-F5344CB8AC3E}">
-        <p14:creationId xmlns:p14="http://schemas.microsoft.com/office/powerpoint/2010/main" val="673503126"/>
+        <p14:creationId xmlns:p14="http://schemas.microsoft.com/office/powerpoint/2010/main" val="2048135404"/>
       </p:ext>
     </p:extLst>
   </p:cSld>
@@ -1242,7 +1247,7 @@
           <a:p>
             <a:fld id="{11A60EF7-69E8-4C76-95C9-086CD8F4F7C7}" type="datetimeFigureOut">
               <a:rPr lang="en-US" smtClean="0"/>
-              <a:t>1/17/2023</a:t>
+              <a:t>1/22/2023</a:t>
             </a:fld>
             <a:endParaRPr lang="en-US"/>
           </a:p>
@@ -1293,7 +1298,7 @@
     </p:spTree>
     <p:extLst>
       <p:ext uri="{BB962C8B-B14F-4D97-AF65-F5344CB8AC3E}">
-        <p14:creationId xmlns:p14="http://schemas.microsoft.com/office/powerpoint/2010/main" val="2069582015"/>
+        <p14:creationId xmlns:p14="http://schemas.microsoft.com/office/powerpoint/2010/main" val="3131368879"/>
       </p:ext>
     </p:extLst>
   </p:cSld>
@@ -1488,7 +1493,7 @@
           <a:p>
             <a:fld id="{11A60EF7-69E8-4C76-95C9-086CD8F4F7C7}" type="datetimeFigureOut">
               <a:rPr lang="en-US" smtClean="0"/>
-              <a:t>1/17/2023</a:t>
+              <a:t>1/22/2023</a:t>
             </a:fld>
             <a:endParaRPr lang="en-US"/>
           </a:p>
@@ -1539,7 +1544,7 @@
     </p:spTree>
     <p:extLst>
       <p:ext uri="{BB962C8B-B14F-4D97-AF65-F5344CB8AC3E}">
-        <p14:creationId xmlns:p14="http://schemas.microsoft.com/office/powerpoint/2010/main" val="3656247166"/>
+        <p14:creationId xmlns:p14="http://schemas.microsoft.com/office/powerpoint/2010/main" val="1282015275"/>
       </p:ext>
     </p:extLst>
   </p:cSld>
@@ -1720,7 +1725,7 @@
           <a:p>
             <a:fld id="{11A60EF7-69E8-4C76-95C9-086CD8F4F7C7}" type="datetimeFigureOut">
               <a:rPr lang="en-US" smtClean="0"/>
-              <a:t>1/17/2023</a:t>
+              <a:t>1/22/2023</a:t>
             </a:fld>
             <a:endParaRPr lang="en-US"/>
           </a:p>
@@ -1771,7 +1776,7 @@
     </p:spTree>
     <p:extLst>
       <p:ext uri="{BB962C8B-B14F-4D97-AF65-F5344CB8AC3E}">
-        <p14:creationId xmlns:p14="http://schemas.microsoft.com/office/powerpoint/2010/main" val="3147933853"/>
+        <p14:creationId xmlns:p14="http://schemas.microsoft.com/office/powerpoint/2010/main" val="3703946583"/>
       </p:ext>
     </p:extLst>
   </p:cSld>
@@ -2087,7 +2092,7 @@
           <a:p>
             <a:fld id="{11A60EF7-69E8-4C76-95C9-086CD8F4F7C7}" type="datetimeFigureOut">
               <a:rPr lang="en-US" smtClean="0"/>
-              <a:t>1/17/2023</a:t>
+              <a:t>1/22/2023</a:t>
             </a:fld>
             <a:endParaRPr lang="en-US"/>
           </a:p>
@@ -2138,7 +2143,7 @@
     </p:spTree>
     <p:extLst>
       <p:ext uri="{BB962C8B-B14F-4D97-AF65-F5344CB8AC3E}">
-        <p14:creationId xmlns:p14="http://schemas.microsoft.com/office/powerpoint/2010/main" val="1449596578"/>
+        <p14:creationId xmlns:p14="http://schemas.microsoft.com/office/powerpoint/2010/main" val="3624347403"/>
       </p:ext>
     </p:extLst>
   </p:cSld>
@@ -2205,7 +2210,7 @@
           <a:p>
             <a:fld id="{11A60EF7-69E8-4C76-95C9-086CD8F4F7C7}" type="datetimeFigureOut">
               <a:rPr lang="en-US" smtClean="0"/>
-              <a:t>1/17/2023</a:t>
+              <a:t>1/22/2023</a:t>
             </a:fld>
             <a:endParaRPr lang="en-US"/>
           </a:p>
@@ -2256,7 +2261,7 @@
     </p:spTree>
     <p:extLst>
       <p:ext uri="{BB962C8B-B14F-4D97-AF65-F5344CB8AC3E}">
-        <p14:creationId xmlns:p14="http://schemas.microsoft.com/office/powerpoint/2010/main" val="942955136"/>
+        <p14:creationId xmlns:p14="http://schemas.microsoft.com/office/powerpoint/2010/main" val="1356158523"/>
       </p:ext>
     </p:extLst>
   </p:cSld>
@@ -2300,7 +2305,7 @@
           <a:p>
             <a:fld id="{11A60EF7-69E8-4C76-95C9-086CD8F4F7C7}" type="datetimeFigureOut">
               <a:rPr lang="en-US" smtClean="0"/>
-              <a:t>1/17/2023</a:t>
+              <a:t>1/22/2023</a:t>
             </a:fld>
             <a:endParaRPr lang="en-US"/>
           </a:p>
@@ -2351,7 +2356,7 @@
     </p:spTree>
     <p:extLst>
       <p:ext uri="{BB962C8B-B14F-4D97-AF65-F5344CB8AC3E}">
-        <p14:creationId xmlns:p14="http://schemas.microsoft.com/office/powerpoint/2010/main" val="460432605"/>
+        <p14:creationId xmlns:p14="http://schemas.microsoft.com/office/powerpoint/2010/main" val="43222593"/>
       </p:ext>
     </p:extLst>
   </p:cSld>
@@ -2577,7 +2582,7 @@
           <a:p>
             <a:fld id="{11A60EF7-69E8-4C76-95C9-086CD8F4F7C7}" type="datetimeFigureOut">
               <a:rPr lang="en-US" smtClean="0"/>
-              <a:t>1/17/2023</a:t>
+              <a:t>1/22/2023</a:t>
             </a:fld>
             <a:endParaRPr lang="en-US"/>
           </a:p>
@@ -2628,7 +2633,7 @@
     </p:spTree>
     <p:extLst>
       <p:ext uri="{BB962C8B-B14F-4D97-AF65-F5344CB8AC3E}">
-        <p14:creationId xmlns:p14="http://schemas.microsoft.com/office/powerpoint/2010/main" val="2558405645"/>
+        <p14:creationId xmlns:p14="http://schemas.microsoft.com/office/powerpoint/2010/main" val="2429007002"/>
       </p:ext>
     </p:extLst>
   </p:cSld>
@@ -2834,7 +2839,7 @@
           <a:p>
             <a:fld id="{11A60EF7-69E8-4C76-95C9-086CD8F4F7C7}" type="datetimeFigureOut">
               <a:rPr lang="en-US" smtClean="0"/>
-              <a:t>1/17/2023</a:t>
+              <a:t>1/22/2023</a:t>
             </a:fld>
             <a:endParaRPr lang="en-US"/>
           </a:p>
@@ -2885,7 +2890,7 @@
     </p:spTree>
     <p:extLst>
       <p:ext uri="{BB962C8B-B14F-4D97-AF65-F5344CB8AC3E}">
-        <p14:creationId xmlns:p14="http://schemas.microsoft.com/office/powerpoint/2010/main" val="4173609344"/>
+        <p14:creationId xmlns:p14="http://schemas.microsoft.com/office/powerpoint/2010/main" val="770913524"/>
       </p:ext>
     </p:extLst>
   </p:cSld>
@@ -3047,7 +3052,7 @@
           <a:p>
             <a:fld id="{11A60EF7-69E8-4C76-95C9-086CD8F4F7C7}" type="datetimeFigureOut">
               <a:rPr lang="en-US" smtClean="0"/>
-              <a:t>1/17/2023</a:t>
+              <a:t>1/22/2023</a:t>
             </a:fld>
             <a:endParaRPr lang="en-US"/>
           </a:p>
@@ -3134,23 +3139,23 @@
     </p:spTree>
     <p:extLst>
       <p:ext uri="{BB962C8B-B14F-4D97-AF65-F5344CB8AC3E}">
-        <p14:creationId xmlns:p14="http://schemas.microsoft.com/office/powerpoint/2010/main" val="2839930272"/>
+        <p14:creationId xmlns:p14="http://schemas.microsoft.com/office/powerpoint/2010/main" val="3805634955"/>
       </p:ext>
     </p:extLst>
   </p:cSld>
   <p:clrMap bg1="lt1" tx1="dk1" bg2="lt2" tx2="dk2" accent1="accent1" accent2="accent2" accent3="accent3" accent4="accent4" accent5="accent5" accent6="accent6" hlink="hlink" folHlink="folHlink"/>
   <p:sldLayoutIdLst>
-    <p:sldLayoutId id="2147483661" r:id="rId1"/>
-    <p:sldLayoutId id="2147483662" r:id="rId2"/>
-    <p:sldLayoutId id="2147483663" r:id="rId3"/>
-    <p:sldLayoutId id="2147483664" r:id="rId4"/>
-    <p:sldLayoutId id="2147483665" r:id="rId5"/>
-    <p:sldLayoutId id="2147483666" r:id="rId6"/>
-    <p:sldLayoutId id="2147483667" r:id="rId7"/>
-    <p:sldLayoutId id="2147483668" r:id="rId8"/>
-    <p:sldLayoutId id="2147483669" r:id="rId9"/>
-    <p:sldLayoutId id="2147483670" r:id="rId10"/>
-    <p:sldLayoutId id="2147483671" r:id="rId11"/>
+    <p:sldLayoutId id="2147483673" r:id="rId1"/>
+    <p:sldLayoutId id="2147483674" r:id="rId2"/>
+    <p:sldLayoutId id="2147483675" r:id="rId3"/>
+    <p:sldLayoutId id="2147483676" r:id="rId4"/>
+    <p:sldLayoutId id="2147483677" r:id="rId5"/>
+    <p:sldLayoutId id="2147483678" r:id="rId6"/>
+    <p:sldLayoutId id="2147483679" r:id="rId7"/>
+    <p:sldLayoutId id="2147483680" r:id="rId8"/>
+    <p:sldLayoutId id="2147483681" r:id="rId9"/>
+    <p:sldLayoutId id="2147483682" r:id="rId10"/>
+    <p:sldLayoutId id="2147483683" r:id="rId11"/>
   </p:sldLayoutIdLst>
   <p:txStyles>
     <p:titleStyle>
@@ -3631,6 +3636,72 @@
           </a:p>
         </p:txBody>
       </p:sp>
+      <p:pic>
+        <p:nvPicPr>
+          <p:cNvPr id="5" name="Immagine 4">
+            <a:extLst>
+              <a:ext uri="{FF2B5EF4-FFF2-40B4-BE49-F238E27FC236}">
+                <a16:creationId xmlns:a16="http://schemas.microsoft.com/office/drawing/2014/main" id="{E97D094D-80F9-08AE-87E2-CFFAADCEC12C}"/>
+              </a:ext>
+            </a:extLst>
+          </p:cNvPr>
+          <p:cNvPicPr>
+            <a:picLocks noChangeAspect="1"/>
+          </p:cNvPicPr>
+          <p:nvPr/>
+        </p:nvPicPr>
+        <p:blipFill>
+          <a:blip r:embed="rId3"/>
+          <a:stretch>
+            <a:fillRect/>
+          </a:stretch>
+        </p:blipFill>
+        <p:spPr>
+          <a:xfrm>
+            <a:off x="634227" y="328402"/>
+            <a:ext cx="3620273" cy="2543596"/>
+          </a:xfrm>
+          <a:prstGeom prst="rect">
+            <a:avLst/>
+          </a:prstGeom>
+        </p:spPr>
+      </p:pic>
+      <p:pic>
+        <p:nvPicPr>
+          <p:cNvPr id="9" name="Immagine 8">
+            <a:extLst>
+              <a:ext uri="{FF2B5EF4-FFF2-40B4-BE49-F238E27FC236}">
+                <a16:creationId xmlns:a16="http://schemas.microsoft.com/office/drawing/2014/main" id="{1058DE5F-6AD0-9E4B-90AB-F6EFB5E7A0AC}"/>
+              </a:ext>
+            </a:extLst>
+          </p:cNvPr>
+          <p:cNvPicPr>
+            <a:picLocks noChangeAspect="1"/>
+          </p:cNvPicPr>
+          <p:nvPr/>
+        </p:nvPicPr>
+        <p:blipFill>
+          <a:blip r:embed="rId4">
+            <a:extLst>
+              <a:ext uri="{28A0092B-C50C-407E-A947-70E740481C1C}">
+                <a14:useLocalDpi xmlns:a14="http://schemas.microsoft.com/office/drawing/2010/main" val="0"/>
+              </a:ext>
+            </a:extLst>
+          </a:blip>
+          <a:stretch>
+            <a:fillRect/>
+          </a:stretch>
+        </p:blipFill>
+        <p:spPr>
+          <a:xfrm>
+            <a:off x="7000467" y="6015950"/>
+            <a:ext cx="898933" cy="755455"/>
+          </a:xfrm>
+          <a:prstGeom prst="rect">
+            <a:avLst/>
+          </a:prstGeom>
+        </p:spPr>
+      </p:pic>
     </p:spTree>
     <p:extLst>
       <p:ext uri="{BB962C8B-B14F-4D97-AF65-F5344CB8AC3E}">
@@ -3661,56 +3732,6 @@
           <a:chExt cx="0" cy="0"/>
         </a:xfrm>
       </p:grpSpPr>
-      <p:sp>
-        <p:nvSpPr>
-          <p:cNvPr id="2" name="Titolo 1">
-            <a:extLst>
-              <a:ext uri="{FF2B5EF4-FFF2-40B4-BE49-F238E27FC236}">
-                <a16:creationId xmlns:a16="http://schemas.microsoft.com/office/drawing/2014/main" id="{539F1744-A1EE-6AF1-924A-5BD1D8C04C1E}"/>
-              </a:ext>
-            </a:extLst>
-          </p:cNvPr>
-          <p:cNvSpPr>
-            <a:spLocks noGrp="1"/>
-          </p:cNvSpPr>
-          <p:nvPr>
-            <p:ph type="title"/>
-          </p:nvPr>
-        </p:nvSpPr>
-        <p:spPr/>
-        <p:txBody>
-          <a:bodyPr/>
-          <a:lstStyle/>
-          <a:p>
-            <a:endParaRPr lang="en-US"/>
-          </a:p>
-        </p:txBody>
-      </p:sp>
-      <p:sp>
-        <p:nvSpPr>
-          <p:cNvPr id="3" name="Segnaposto contenuto 2">
-            <a:extLst>
-              <a:ext uri="{FF2B5EF4-FFF2-40B4-BE49-F238E27FC236}">
-                <a16:creationId xmlns:a16="http://schemas.microsoft.com/office/drawing/2014/main" id="{2FB31392-D216-4AA1-3EE3-2B2D7E0C53FC}"/>
-              </a:ext>
-            </a:extLst>
-          </p:cNvPr>
-          <p:cNvSpPr>
-            <a:spLocks noGrp="1"/>
-          </p:cNvSpPr>
-          <p:nvPr>
-            <p:ph idx="1"/>
-          </p:nvPr>
-        </p:nvSpPr>
-        <p:spPr/>
-        <p:txBody>
-          <a:bodyPr/>
-          <a:lstStyle/>
-          <a:p>
-            <a:endParaRPr lang="en-US"/>
-          </a:p>
-        </p:txBody>
-      </p:sp>
     </p:spTree>
     <p:extLst>
       <p:ext uri="{BB962C8B-B14F-4D97-AF65-F5344CB8AC3E}">
@@ -3725,7 +3746,7 @@
 </file>
 
 <file path=ppt/theme/theme1.xml><?xml version="1.0" encoding="utf-8"?>
-<a:theme xmlns:a="http://schemas.openxmlformats.org/drawingml/2006/main" name="Tema di Office">
+<a:theme xmlns:a="http://schemas.openxmlformats.org/drawingml/2006/main" name="MealMateTheme">
   <a:themeElements>
     <a:clrScheme name="PaletteMealMate">
       <a:dk1>
@@ -3979,7 +4000,7 @@
   <a:extraClrSchemeLst/>
   <a:extLst>
     <a:ext uri="{05A4C25C-085E-4340-85A3-A5531E510DB2}">
-      <thm15:themeFamily xmlns:thm15="http://schemas.microsoft.com/office/thememl/2012/main" name="Office Theme 2013 - 2022" id="{62F939B6-93AF-4DB8-9C6B-D6C7DFDC589F}" vid="{AE6F2518-B084-4896-AF52-66CC2144AA26}"/>
+      <thm15:themeFamily xmlns:thm15="http://schemas.microsoft.com/office/thememl/2012/main" name="MealMateTheme" id="{92064112-56A4-4AFB-B922-BAE4A342F747}" vid="{1465BCEF-565F-4256-B4D6-CD6F23F11023}"/>
     </a:ext>
   </a:extLst>
 </a:theme>

</xml_diff>